<commit_message>
[problem] opt shoot have some place problem
</commit_message>
<xml_diff>
--- a/final_project/mk_icon.pptx
+++ b/final_project/mk_icon.pptx
@@ -288,7 +288,7 @@
           <a:p>
             <a:fld id="{8DF3BF37-1F50-45DE-A1E5-A5CB67568958}" type="datetimeFigureOut">
               <a:rPr lang="zh-TW" altLang="en-US" smtClean="0"/>
-              <a:t>2023/12/3</a:t>
+              <a:t>2023/12/10</a:t>
             </a:fld>
             <a:endParaRPr lang="zh-TW" altLang="en-US"/>
           </a:p>
@@ -458,7 +458,7 @@
           <a:p>
             <a:fld id="{8DF3BF37-1F50-45DE-A1E5-A5CB67568958}" type="datetimeFigureOut">
               <a:rPr lang="zh-TW" altLang="en-US" smtClean="0"/>
-              <a:t>2023/12/3</a:t>
+              <a:t>2023/12/10</a:t>
             </a:fld>
             <a:endParaRPr lang="zh-TW" altLang="en-US"/>
           </a:p>
@@ -638,7 +638,7 @@
           <a:p>
             <a:fld id="{8DF3BF37-1F50-45DE-A1E5-A5CB67568958}" type="datetimeFigureOut">
               <a:rPr lang="zh-TW" altLang="en-US" smtClean="0"/>
-              <a:t>2023/12/3</a:t>
+              <a:t>2023/12/10</a:t>
             </a:fld>
             <a:endParaRPr lang="zh-TW" altLang="en-US"/>
           </a:p>
@@ -808,7 +808,7 @@
           <a:p>
             <a:fld id="{8DF3BF37-1F50-45DE-A1E5-A5CB67568958}" type="datetimeFigureOut">
               <a:rPr lang="zh-TW" altLang="en-US" smtClean="0"/>
-              <a:t>2023/12/3</a:t>
+              <a:t>2023/12/10</a:t>
             </a:fld>
             <a:endParaRPr lang="zh-TW" altLang="en-US"/>
           </a:p>
@@ -1054,7 +1054,7 @@
           <a:p>
             <a:fld id="{8DF3BF37-1F50-45DE-A1E5-A5CB67568958}" type="datetimeFigureOut">
               <a:rPr lang="zh-TW" altLang="en-US" smtClean="0"/>
-              <a:t>2023/12/3</a:t>
+              <a:t>2023/12/10</a:t>
             </a:fld>
             <a:endParaRPr lang="zh-TW" altLang="en-US"/>
           </a:p>
@@ -1342,7 +1342,7 @@
           <a:p>
             <a:fld id="{8DF3BF37-1F50-45DE-A1E5-A5CB67568958}" type="datetimeFigureOut">
               <a:rPr lang="zh-TW" altLang="en-US" smtClean="0"/>
-              <a:t>2023/12/3</a:t>
+              <a:t>2023/12/10</a:t>
             </a:fld>
             <a:endParaRPr lang="zh-TW" altLang="en-US"/>
           </a:p>
@@ -1764,7 +1764,7 @@
           <a:p>
             <a:fld id="{8DF3BF37-1F50-45DE-A1E5-A5CB67568958}" type="datetimeFigureOut">
               <a:rPr lang="zh-TW" altLang="en-US" smtClean="0"/>
-              <a:t>2023/12/3</a:t>
+              <a:t>2023/12/10</a:t>
             </a:fld>
             <a:endParaRPr lang="zh-TW" altLang="en-US"/>
           </a:p>
@@ -1882,7 +1882,7 @@
           <a:p>
             <a:fld id="{8DF3BF37-1F50-45DE-A1E5-A5CB67568958}" type="datetimeFigureOut">
               <a:rPr lang="zh-TW" altLang="en-US" smtClean="0"/>
-              <a:t>2023/12/3</a:t>
+              <a:t>2023/12/10</a:t>
             </a:fld>
             <a:endParaRPr lang="zh-TW" altLang="en-US"/>
           </a:p>
@@ -1977,7 +1977,7 @@
           <a:p>
             <a:fld id="{8DF3BF37-1F50-45DE-A1E5-A5CB67568958}" type="datetimeFigureOut">
               <a:rPr lang="zh-TW" altLang="en-US" smtClean="0"/>
-              <a:t>2023/12/3</a:t>
+              <a:t>2023/12/10</a:t>
             </a:fld>
             <a:endParaRPr lang="zh-TW" altLang="en-US"/>
           </a:p>
@@ -2254,7 +2254,7 @@
           <a:p>
             <a:fld id="{8DF3BF37-1F50-45DE-A1E5-A5CB67568958}" type="datetimeFigureOut">
               <a:rPr lang="zh-TW" altLang="en-US" smtClean="0"/>
-              <a:t>2023/12/3</a:t>
+              <a:t>2023/12/10</a:t>
             </a:fld>
             <a:endParaRPr lang="zh-TW" altLang="en-US"/>
           </a:p>
@@ -2507,7 +2507,7 @@
           <a:p>
             <a:fld id="{8DF3BF37-1F50-45DE-A1E5-A5CB67568958}" type="datetimeFigureOut">
               <a:rPr lang="zh-TW" altLang="en-US" smtClean="0"/>
-              <a:t>2023/12/3</a:t>
+              <a:t>2023/12/10</a:t>
             </a:fld>
             <a:endParaRPr lang="zh-TW" altLang="en-US"/>
           </a:p>
@@ -2720,7 +2720,7 @@
           <a:p>
             <a:fld id="{8DF3BF37-1F50-45DE-A1E5-A5CB67568958}" type="datetimeFigureOut">
               <a:rPr lang="zh-TW" altLang="en-US" smtClean="0"/>
-              <a:t>2023/12/3</a:t>
+              <a:t>2023/12/10</a:t>
             </a:fld>
             <a:endParaRPr lang="zh-TW" altLang="en-US"/>
           </a:p>
@@ -3185,7 +3185,7 @@
                 <a:latin typeface="俐方体11号" pitchFamily="2" charset="-122"/>
                 <a:ea typeface="俐方体11号" pitchFamily="2" charset="-122"/>
               </a:rPr>
-              <a:t>開始遊戲</a:t>
+              <a:t>挑戰模式</a:t>
             </a:r>
             <a:endParaRPr lang="zh-TW" altLang="en-US" dirty="0">
               <a:latin typeface="俐方体11号" pitchFamily="2" charset="-122"/>
@@ -3194,6 +3194,57 @@
           </a:p>
         </p:txBody>
       </p:sp>
+      <p:pic>
+        <p:nvPicPr>
+          <p:cNvPr id="5" name="圖片 4"/>
+          <p:cNvPicPr>
+            <a:picLocks noChangeAspect="1"/>
+          </p:cNvPicPr>
+          <p:nvPr/>
+        </p:nvPicPr>
+        <p:blipFill>
+          <a:blip r:embed="rId4">
+            <a:clrChange>
+              <a:clrFrom>
+                <a:srgbClr val="000000">
+                  <a:alpha val="0"/>
+                </a:srgbClr>
+              </a:clrFrom>
+              <a:clrTo>
+                <a:srgbClr val="000000">
+                  <a:alpha val="0"/>
+                </a:srgbClr>
+              </a:clrTo>
+            </a:clrChange>
+            <a:extLst>
+              <a:ext uri="{BEBA8EAE-BF5A-486C-A8C5-ECC9F3942E4B}">
+                <a14:imgProps xmlns:a14="http://schemas.microsoft.com/office/drawing/2010/main">
+                  <a14:imgLayer r:embed="rId5">
+                    <a14:imgEffect>
+                      <a14:artisticCrisscrossEtching/>
+                    </a14:imgEffect>
+                  </a14:imgLayer>
+                </a14:imgProps>
+              </a:ext>
+              <a:ext uri="{28A0092B-C50C-407E-A947-70E740481C1C}">
+                <a14:useLocalDpi xmlns:a14="http://schemas.microsoft.com/office/drawing/2010/main" val="0"/>
+              </a:ext>
+            </a:extLst>
+          </a:blip>
+          <a:stretch>
+            <a:fillRect/>
+          </a:stretch>
+        </p:blipFill>
+        <p:spPr>
+          <a:xfrm>
+            <a:off x="467544" y="2348880"/>
+            <a:ext cx="457200" cy="457200"/>
+          </a:xfrm>
+          <a:prstGeom prst="rect">
+            <a:avLst/>
+          </a:prstGeom>
+        </p:spPr>
+      </p:pic>
     </p:spTree>
     <p:extLst>
       <p:ext uri="{BB962C8B-B14F-4D97-AF65-F5344CB8AC3E}">

</xml_diff>

<commit_message>
[upload] mainplayer die fun ac
</commit_message>
<xml_diff>
--- a/final_project/mk_icon.pptx
+++ b/final_project/mk_icon.pptx
@@ -288,7 +288,7 @@
           <a:p>
             <a:fld id="{8DF3BF37-1F50-45DE-A1E5-A5CB67568958}" type="datetimeFigureOut">
               <a:rPr lang="zh-TW" altLang="en-US" smtClean="0"/>
-              <a:t>2023/12/10</a:t>
+              <a:t>2023/12/21</a:t>
             </a:fld>
             <a:endParaRPr lang="zh-TW" altLang="en-US"/>
           </a:p>
@@ -458,7 +458,7 @@
           <a:p>
             <a:fld id="{8DF3BF37-1F50-45DE-A1E5-A5CB67568958}" type="datetimeFigureOut">
               <a:rPr lang="zh-TW" altLang="en-US" smtClean="0"/>
-              <a:t>2023/12/10</a:t>
+              <a:t>2023/12/21</a:t>
             </a:fld>
             <a:endParaRPr lang="zh-TW" altLang="en-US"/>
           </a:p>
@@ -638,7 +638,7 @@
           <a:p>
             <a:fld id="{8DF3BF37-1F50-45DE-A1E5-A5CB67568958}" type="datetimeFigureOut">
               <a:rPr lang="zh-TW" altLang="en-US" smtClean="0"/>
-              <a:t>2023/12/10</a:t>
+              <a:t>2023/12/21</a:t>
             </a:fld>
             <a:endParaRPr lang="zh-TW" altLang="en-US"/>
           </a:p>
@@ -808,7 +808,7 @@
           <a:p>
             <a:fld id="{8DF3BF37-1F50-45DE-A1E5-A5CB67568958}" type="datetimeFigureOut">
               <a:rPr lang="zh-TW" altLang="en-US" smtClean="0"/>
-              <a:t>2023/12/10</a:t>
+              <a:t>2023/12/21</a:t>
             </a:fld>
             <a:endParaRPr lang="zh-TW" altLang="en-US"/>
           </a:p>
@@ -1054,7 +1054,7 @@
           <a:p>
             <a:fld id="{8DF3BF37-1F50-45DE-A1E5-A5CB67568958}" type="datetimeFigureOut">
               <a:rPr lang="zh-TW" altLang="en-US" smtClean="0"/>
-              <a:t>2023/12/10</a:t>
+              <a:t>2023/12/21</a:t>
             </a:fld>
             <a:endParaRPr lang="zh-TW" altLang="en-US"/>
           </a:p>
@@ -1342,7 +1342,7 @@
           <a:p>
             <a:fld id="{8DF3BF37-1F50-45DE-A1E5-A5CB67568958}" type="datetimeFigureOut">
               <a:rPr lang="zh-TW" altLang="en-US" smtClean="0"/>
-              <a:t>2023/12/10</a:t>
+              <a:t>2023/12/21</a:t>
             </a:fld>
             <a:endParaRPr lang="zh-TW" altLang="en-US"/>
           </a:p>
@@ -1764,7 +1764,7 @@
           <a:p>
             <a:fld id="{8DF3BF37-1F50-45DE-A1E5-A5CB67568958}" type="datetimeFigureOut">
               <a:rPr lang="zh-TW" altLang="en-US" smtClean="0"/>
-              <a:t>2023/12/10</a:t>
+              <a:t>2023/12/21</a:t>
             </a:fld>
             <a:endParaRPr lang="zh-TW" altLang="en-US"/>
           </a:p>
@@ -1882,7 +1882,7 @@
           <a:p>
             <a:fld id="{8DF3BF37-1F50-45DE-A1E5-A5CB67568958}" type="datetimeFigureOut">
               <a:rPr lang="zh-TW" altLang="en-US" smtClean="0"/>
-              <a:t>2023/12/10</a:t>
+              <a:t>2023/12/21</a:t>
             </a:fld>
             <a:endParaRPr lang="zh-TW" altLang="en-US"/>
           </a:p>
@@ -1977,7 +1977,7 @@
           <a:p>
             <a:fld id="{8DF3BF37-1F50-45DE-A1E5-A5CB67568958}" type="datetimeFigureOut">
               <a:rPr lang="zh-TW" altLang="en-US" smtClean="0"/>
-              <a:t>2023/12/10</a:t>
+              <a:t>2023/12/21</a:t>
             </a:fld>
             <a:endParaRPr lang="zh-TW" altLang="en-US"/>
           </a:p>
@@ -2254,7 +2254,7 @@
           <a:p>
             <a:fld id="{8DF3BF37-1F50-45DE-A1E5-A5CB67568958}" type="datetimeFigureOut">
               <a:rPr lang="zh-TW" altLang="en-US" smtClean="0"/>
-              <a:t>2023/12/10</a:t>
+              <a:t>2023/12/21</a:t>
             </a:fld>
             <a:endParaRPr lang="zh-TW" altLang="en-US"/>
           </a:p>
@@ -2507,7 +2507,7 @@
           <a:p>
             <a:fld id="{8DF3BF37-1F50-45DE-A1E5-A5CB67568958}" type="datetimeFigureOut">
               <a:rPr lang="zh-TW" altLang="en-US" smtClean="0"/>
-              <a:t>2023/12/10</a:t>
+              <a:t>2023/12/21</a:t>
             </a:fld>
             <a:endParaRPr lang="zh-TW" altLang="en-US"/>
           </a:p>
@@ -2720,7 +2720,7 @@
           <a:p>
             <a:fld id="{8DF3BF37-1F50-45DE-A1E5-A5CB67568958}" type="datetimeFigureOut">
               <a:rPr lang="zh-TW" altLang="en-US" smtClean="0"/>
-              <a:t>2023/12/10</a:t>
+              <a:t>2023/12/21</a:t>
             </a:fld>
             <a:endParaRPr lang="zh-TW" altLang="en-US"/>
           </a:p>
@@ -3185,7 +3185,7 @@
                 <a:latin typeface="俐方体11号" pitchFamily="2" charset="-122"/>
                 <a:ea typeface="俐方体11号" pitchFamily="2" charset="-122"/>
               </a:rPr>
-              <a:t>挑戰模式</a:t>
+              <a:t>重新開始</a:t>
             </a:r>
             <a:endParaRPr lang="zh-TW" altLang="en-US" dirty="0">
               <a:latin typeface="俐方体11号" pitchFamily="2" charset="-122"/>

</xml_diff>

<commit_message>
[upload] dob std fun ac
</commit_message>
<xml_diff>
--- a/final_project/mk_icon.pptx
+++ b/final_project/mk_icon.pptx
@@ -288,7 +288,7 @@
           <a:p>
             <a:fld id="{8DF3BF37-1F50-45DE-A1E5-A5CB67568958}" type="datetimeFigureOut">
               <a:rPr lang="zh-TW" altLang="en-US" smtClean="0"/>
-              <a:t>2023/12/21</a:t>
+              <a:t>2023/12/22</a:t>
             </a:fld>
             <a:endParaRPr lang="zh-TW" altLang="en-US"/>
           </a:p>
@@ -458,7 +458,7 @@
           <a:p>
             <a:fld id="{8DF3BF37-1F50-45DE-A1E5-A5CB67568958}" type="datetimeFigureOut">
               <a:rPr lang="zh-TW" altLang="en-US" smtClean="0"/>
-              <a:t>2023/12/21</a:t>
+              <a:t>2023/12/22</a:t>
             </a:fld>
             <a:endParaRPr lang="zh-TW" altLang="en-US"/>
           </a:p>
@@ -638,7 +638,7 @@
           <a:p>
             <a:fld id="{8DF3BF37-1F50-45DE-A1E5-A5CB67568958}" type="datetimeFigureOut">
               <a:rPr lang="zh-TW" altLang="en-US" smtClean="0"/>
-              <a:t>2023/12/21</a:t>
+              <a:t>2023/12/22</a:t>
             </a:fld>
             <a:endParaRPr lang="zh-TW" altLang="en-US"/>
           </a:p>
@@ -808,7 +808,7 @@
           <a:p>
             <a:fld id="{8DF3BF37-1F50-45DE-A1E5-A5CB67568958}" type="datetimeFigureOut">
               <a:rPr lang="zh-TW" altLang="en-US" smtClean="0"/>
-              <a:t>2023/12/21</a:t>
+              <a:t>2023/12/22</a:t>
             </a:fld>
             <a:endParaRPr lang="zh-TW" altLang="en-US"/>
           </a:p>
@@ -1054,7 +1054,7 @@
           <a:p>
             <a:fld id="{8DF3BF37-1F50-45DE-A1E5-A5CB67568958}" type="datetimeFigureOut">
               <a:rPr lang="zh-TW" altLang="en-US" smtClean="0"/>
-              <a:t>2023/12/21</a:t>
+              <a:t>2023/12/22</a:t>
             </a:fld>
             <a:endParaRPr lang="zh-TW" altLang="en-US"/>
           </a:p>
@@ -1342,7 +1342,7 @@
           <a:p>
             <a:fld id="{8DF3BF37-1F50-45DE-A1E5-A5CB67568958}" type="datetimeFigureOut">
               <a:rPr lang="zh-TW" altLang="en-US" smtClean="0"/>
-              <a:t>2023/12/21</a:t>
+              <a:t>2023/12/22</a:t>
             </a:fld>
             <a:endParaRPr lang="zh-TW" altLang="en-US"/>
           </a:p>
@@ -1764,7 +1764,7 @@
           <a:p>
             <a:fld id="{8DF3BF37-1F50-45DE-A1E5-A5CB67568958}" type="datetimeFigureOut">
               <a:rPr lang="zh-TW" altLang="en-US" smtClean="0"/>
-              <a:t>2023/12/21</a:t>
+              <a:t>2023/12/22</a:t>
             </a:fld>
             <a:endParaRPr lang="zh-TW" altLang="en-US"/>
           </a:p>
@@ -1882,7 +1882,7 @@
           <a:p>
             <a:fld id="{8DF3BF37-1F50-45DE-A1E5-A5CB67568958}" type="datetimeFigureOut">
               <a:rPr lang="zh-TW" altLang="en-US" smtClean="0"/>
-              <a:t>2023/12/21</a:t>
+              <a:t>2023/12/22</a:t>
             </a:fld>
             <a:endParaRPr lang="zh-TW" altLang="en-US"/>
           </a:p>
@@ -1977,7 +1977,7 @@
           <a:p>
             <a:fld id="{8DF3BF37-1F50-45DE-A1E5-A5CB67568958}" type="datetimeFigureOut">
               <a:rPr lang="zh-TW" altLang="en-US" smtClean="0"/>
-              <a:t>2023/12/21</a:t>
+              <a:t>2023/12/22</a:t>
             </a:fld>
             <a:endParaRPr lang="zh-TW" altLang="en-US"/>
           </a:p>
@@ -2254,7 +2254,7 @@
           <a:p>
             <a:fld id="{8DF3BF37-1F50-45DE-A1E5-A5CB67568958}" type="datetimeFigureOut">
               <a:rPr lang="zh-TW" altLang="en-US" smtClean="0"/>
-              <a:t>2023/12/21</a:t>
+              <a:t>2023/12/22</a:t>
             </a:fld>
             <a:endParaRPr lang="zh-TW" altLang="en-US"/>
           </a:p>
@@ -2507,7 +2507,7 @@
           <a:p>
             <a:fld id="{8DF3BF37-1F50-45DE-A1E5-A5CB67568958}" type="datetimeFigureOut">
               <a:rPr lang="zh-TW" altLang="en-US" smtClean="0"/>
-              <a:t>2023/12/21</a:t>
+              <a:t>2023/12/22</a:t>
             </a:fld>
             <a:endParaRPr lang="zh-TW" altLang="en-US"/>
           </a:p>
@@ -2720,7 +2720,7 @@
           <a:p>
             <a:fld id="{8DF3BF37-1F50-45DE-A1E5-A5CB67568958}" type="datetimeFigureOut">
               <a:rPr lang="zh-TW" altLang="en-US" smtClean="0"/>
-              <a:t>2023/12/21</a:t>
+              <a:t>2023/12/22</a:t>
             </a:fld>
             <a:endParaRPr lang="zh-TW" altLang="en-US"/>
           </a:p>
@@ -3245,6 +3245,66 @@
           </a:prstGeom>
         </p:spPr>
       </p:pic>
+      <p:pic>
+        <p:nvPicPr>
+          <p:cNvPr id="6" name="圖片 5"/>
+          <p:cNvPicPr>
+            <a:picLocks noChangeAspect="1"/>
+          </p:cNvPicPr>
+          <p:nvPr/>
+        </p:nvPicPr>
+        <p:blipFill>
+          <a:blip r:embed="rId6">
+            <a:extLst>
+              <a:ext uri="{28A0092B-C50C-407E-A947-70E740481C1C}">
+                <a14:useLocalDpi xmlns:a14="http://schemas.microsoft.com/office/drawing/2010/main" val="0"/>
+              </a:ext>
+            </a:extLst>
+          </a:blip>
+          <a:stretch>
+            <a:fillRect/>
+          </a:stretch>
+        </p:blipFill>
+        <p:spPr>
+          <a:xfrm rot="10800000">
+            <a:off x="493670" y="3200368"/>
+            <a:ext cx="457264" cy="457264"/>
+          </a:xfrm>
+          <a:prstGeom prst="rect">
+            <a:avLst/>
+          </a:prstGeom>
+        </p:spPr>
+      </p:pic>
+      <p:pic>
+        <p:nvPicPr>
+          <p:cNvPr id="7" name="圖片 6"/>
+          <p:cNvPicPr>
+            <a:picLocks noChangeAspect="1"/>
+          </p:cNvPicPr>
+          <p:nvPr/>
+        </p:nvPicPr>
+        <p:blipFill>
+          <a:blip r:embed="rId7">
+            <a:extLst>
+              <a:ext uri="{28A0092B-C50C-407E-A947-70E740481C1C}">
+                <a14:useLocalDpi xmlns:a14="http://schemas.microsoft.com/office/drawing/2010/main" val="0"/>
+              </a:ext>
+            </a:extLst>
+          </a:blip>
+          <a:stretch>
+            <a:fillRect/>
+          </a:stretch>
+        </p:blipFill>
+        <p:spPr>
+          <a:xfrm rot="10800000">
+            <a:off x="4343428" y="3200428"/>
+            <a:ext cx="457143" cy="457143"/>
+          </a:xfrm>
+          <a:prstGeom prst="rect">
+            <a:avLst/>
+          </a:prstGeom>
+        </p:spPr>
+      </p:pic>
     </p:spTree>
     <p:extLst>
       <p:ext uri="{BB962C8B-B14F-4D97-AF65-F5344CB8AC3E}">

</xml_diff>

<commit_message>
[upload] AC dob (not propr) fix all problem it have
</commit_message>
<xml_diff>
--- a/final_project/mk_icon.pptx
+++ b/final_project/mk_icon.pptx
@@ -3185,7 +3185,7 @@
                 <a:latin typeface="俐方体11号" pitchFamily="2" charset="-122"/>
                 <a:ea typeface="俐方体11号" pitchFamily="2" charset="-122"/>
               </a:rPr>
-              <a:t>重新開始</a:t>
+              <a:t>一般模式</a:t>
             </a:r>
             <a:endParaRPr lang="zh-TW" altLang="en-US" dirty="0">
               <a:latin typeface="俐方体11号" pitchFamily="2" charset="-122"/>
@@ -3299,6 +3299,36 @@
           <a:xfrm rot="10800000">
             <a:off x="4343428" y="3200428"/>
             <a:ext cx="457143" cy="457143"/>
+          </a:xfrm>
+          <a:prstGeom prst="rect">
+            <a:avLst/>
+          </a:prstGeom>
+        </p:spPr>
+      </p:pic>
+      <p:pic>
+        <p:nvPicPr>
+          <p:cNvPr id="8" name="圖片 7"/>
+          <p:cNvPicPr>
+            <a:picLocks noChangeAspect="1"/>
+          </p:cNvPicPr>
+          <p:nvPr/>
+        </p:nvPicPr>
+        <p:blipFill>
+          <a:blip r:embed="rId8">
+            <a:extLst>
+              <a:ext uri="{28A0092B-C50C-407E-A947-70E740481C1C}">
+                <a14:useLocalDpi xmlns:a14="http://schemas.microsoft.com/office/drawing/2010/main" val="0"/>
+              </a:ext>
+            </a:extLst>
+          </a:blip>
+          <a:stretch>
+            <a:fillRect/>
+          </a:stretch>
+        </p:blipFill>
+        <p:spPr>
+          <a:xfrm rot="10800000">
+            <a:off x="2771800" y="3200400"/>
+            <a:ext cx="457200" cy="457200"/>
           </a:xfrm>
           <a:prstGeom prst="rect">
             <a:avLst/>

</xml_diff>

<commit_message>
[upload] half change step AC
</commit_message>
<xml_diff>
--- a/final_project/mk_icon.pptx
+++ b/final_project/mk_icon.pptx
@@ -288,7 +288,7 @@
           <a:p>
             <a:fld id="{8DF3BF37-1F50-45DE-A1E5-A5CB67568958}" type="datetimeFigureOut">
               <a:rPr lang="zh-TW" altLang="en-US" smtClean="0"/>
-              <a:t>2023/12/22</a:t>
+              <a:t>2023/12/24</a:t>
             </a:fld>
             <a:endParaRPr lang="zh-TW" altLang="en-US"/>
           </a:p>
@@ -458,7 +458,7 @@
           <a:p>
             <a:fld id="{8DF3BF37-1F50-45DE-A1E5-A5CB67568958}" type="datetimeFigureOut">
               <a:rPr lang="zh-TW" altLang="en-US" smtClean="0"/>
-              <a:t>2023/12/22</a:t>
+              <a:t>2023/12/24</a:t>
             </a:fld>
             <a:endParaRPr lang="zh-TW" altLang="en-US"/>
           </a:p>
@@ -638,7 +638,7 @@
           <a:p>
             <a:fld id="{8DF3BF37-1F50-45DE-A1E5-A5CB67568958}" type="datetimeFigureOut">
               <a:rPr lang="zh-TW" altLang="en-US" smtClean="0"/>
-              <a:t>2023/12/22</a:t>
+              <a:t>2023/12/24</a:t>
             </a:fld>
             <a:endParaRPr lang="zh-TW" altLang="en-US"/>
           </a:p>
@@ -808,7 +808,7 @@
           <a:p>
             <a:fld id="{8DF3BF37-1F50-45DE-A1E5-A5CB67568958}" type="datetimeFigureOut">
               <a:rPr lang="zh-TW" altLang="en-US" smtClean="0"/>
-              <a:t>2023/12/22</a:t>
+              <a:t>2023/12/24</a:t>
             </a:fld>
             <a:endParaRPr lang="zh-TW" altLang="en-US"/>
           </a:p>
@@ -1054,7 +1054,7 @@
           <a:p>
             <a:fld id="{8DF3BF37-1F50-45DE-A1E5-A5CB67568958}" type="datetimeFigureOut">
               <a:rPr lang="zh-TW" altLang="en-US" smtClean="0"/>
-              <a:t>2023/12/22</a:t>
+              <a:t>2023/12/24</a:t>
             </a:fld>
             <a:endParaRPr lang="zh-TW" altLang="en-US"/>
           </a:p>
@@ -1342,7 +1342,7 @@
           <a:p>
             <a:fld id="{8DF3BF37-1F50-45DE-A1E5-A5CB67568958}" type="datetimeFigureOut">
               <a:rPr lang="zh-TW" altLang="en-US" smtClean="0"/>
-              <a:t>2023/12/22</a:t>
+              <a:t>2023/12/24</a:t>
             </a:fld>
             <a:endParaRPr lang="zh-TW" altLang="en-US"/>
           </a:p>
@@ -1764,7 +1764,7 @@
           <a:p>
             <a:fld id="{8DF3BF37-1F50-45DE-A1E5-A5CB67568958}" type="datetimeFigureOut">
               <a:rPr lang="zh-TW" altLang="en-US" smtClean="0"/>
-              <a:t>2023/12/22</a:t>
+              <a:t>2023/12/24</a:t>
             </a:fld>
             <a:endParaRPr lang="zh-TW" altLang="en-US"/>
           </a:p>
@@ -1882,7 +1882,7 @@
           <a:p>
             <a:fld id="{8DF3BF37-1F50-45DE-A1E5-A5CB67568958}" type="datetimeFigureOut">
               <a:rPr lang="zh-TW" altLang="en-US" smtClean="0"/>
-              <a:t>2023/12/22</a:t>
+              <a:t>2023/12/24</a:t>
             </a:fld>
             <a:endParaRPr lang="zh-TW" altLang="en-US"/>
           </a:p>
@@ -1977,7 +1977,7 @@
           <a:p>
             <a:fld id="{8DF3BF37-1F50-45DE-A1E5-A5CB67568958}" type="datetimeFigureOut">
               <a:rPr lang="zh-TW" altLang="en-US" smtClean="0"/>
-              <a:t>2023/12/22</a:t>
+              <a:t>2023/12/24</a:t>
             </a:fld>
             <a:endParaRPr lang="zh-TW" altLang="en-US"/>
           </a:p>
@@ -2254,7 +2254,7 @@
           <a:p>
             <a:fld id="{8DF3BF37-1F50-45DE-A1E5-A5CB67568958}" type="datetimeFigureOut">
               <a:rPr lang="zh-TW" altLang="en-US" smtClean="0"/>
-              <a:t>2023/12/22</a:t>
+              <a:t>2023/12/24</a:t>
             </a:fld>
             <a:endParaRPr lang="zh-TW" altLang="en-US"/>
           </a:p>
@@ -2507,7 +2507,7 @@
           <a:p>
             <a:fld id="{8DF3BF37-1F50-45DE-A1E5-A5CB67568958}" type="datetimeFigureOut">
               <a:rPr lang="zh-TW" altLang="en-US" smtClean="0"/>
-              <a:t>2023/12/22</a:t>
+              <a:t>2023/12/24</a:t>
             </a:fld>
             <a:endParaRPr lang="zh-TW" altLang="en-US"/>
           </a:p>
@@ -2720,7 +2720,7 @@
           <a:p>
             <a:fld id="{8DF3BF37-1F50-45DE-A1E5-A5CB67568958}" type="datetimeFigureOut">
               <a:rPr lang="zh-TW" altLang="en-US" smtClean="0"/>
-              <a:t>2023/12/22</a:t>
+              <a:t>2023/12/24</a:t>
             </a:fld>
             <a:endParaRPr lang="zh-TW" altLang="en-US"/>
           </a:p>
@@ -3133,7 +3133,7 @@
         </p:blipFill>
         <p:spPr>
           <a:xfrm>
-            <a:off x="1863634" y="1724296"/>
+            <a:off x="493670" y="476672"/>
             <a:ext cx="4345577" cy="1436915"/>
           </a:xfrm>
           <a:prstGeom prst="rect">
@@ -3143,25 +3143,6 @@
       </p:pic>
       <p:sp>
         <p:nvSpPr>
-          <p:cNvPr id="3" name="副標題 2"/>
-          <p:cNvSpPr>
-            <a:spLocks noGrp="1"/>
-          </p:cNvSpPr>
-          <p:nvPr>
-            <p:ph type="subTitle" idx="1"/>
-          </p:nvPr>
-        </p:nvSpPr>
-        <p:spPr/>
-        <p:txBody>
-          <a:bodyPr/>
-          <a:lstStyle/>
-          <a:p>
-            <a:endParaRPr lang="zh-TW" altLang="en-US"/>
-          </a:p>
-        </p:txBody>
-      </p:sp>
-      <p:sp>
-        <p:nvSpPr>
           <p:cNvPr id="2" name="標題 1"/>
           <p:cNvSpPr>
             <a:spLocks noGrp="1"/>
@@ -3172,7 +3153,7 @@
         </p:nvSpPr>
         <p:spPr>
           <a:xfrm>
-            <a:off x="2051720" y="1844824"/>
+            <a:off x="681756" y="597200"/>
             <a:ext cx="3960440" cy="1229197"/>
           </a:xfrm>
         </p:spPr>
@@ -3297,7 +3278,7 @@
         </p:blipFill>
         <p:spPr>
           <a:xfrm rot="10800000">
-            <a:off x="4343428" y="3200428"/>
+            <a:off x="1259632" y="2501499"/>
             <a:ext cx="457143" cy="457143"/>
           </a:xfrm>
           <a:prstGeom prst="rect">
@@ -3327,7 +3308,7 @@
         </p:blipFill>
         <p:spPr>
           <a:xfrm rot="10800000">
-            <a:off x="2771800" y="3200400"/>
+            <a:off x="924744" y="3334558"/>
             <a:ext cx="457200" cy="457200"/>
           </a:xfrm>
           <a:prstGeom prst="rect">
@@ -3335,6 +3316,130 @@
           </a:prstGeom>
         </p:spPr>
       </p:pic>
+      <p:pic>
+        <p:nvPicPr>
+          <p:cNvPr id="9" name="圖片 8"/>
+          <p:cNvPicPr>
+            <a:picLocks noChangeAspect="1"/>
+          </p:cNvPicPr>
+          <p:nvPr/>
+        </p:nvPicPr>
+        <p:blipFill>
+          <a:blip r:embed="rId9">
+            <a:extLst>
+              <a:ext uri="{28A0092B-C50C-407E-A947-70E740481C1C}">
+                <a14:useLocalDpi xmlns:a14="http://schemas.microsoft.com/office/drawing/2010/main" val="0"/>
+              </a:ext>
+            </a:extLst>
+          </a:blip>
+          <a:stretch>
+            <a:fillRect/>
+          </a:stretch>
+        </p:blipFill>
+        <p:spPr>
+          <a:xfrm>
+            <a:off x="4839247" y="1772816"/>
+            <a:ext cx="4509120" cy="4509120"/>
+          </a:xfrm>
+          <a:prstGeom prst="rect">
+            <a:avLst/>
+          </a:prstGeom>
+          <a:noFill/>
+          <a:ln>
+            <a:noFill/>
+          </a:ln>
+        </p:spPr>
+      </p:pic>
+      <p:sp>
+        <p:nvSpPr>
+          <p:cNvPr id="10" name="矩形 9"/>
+          <p:cNvSpPr/>
+          <p:nvPr/>
+        </p:nvSpPr>
+        <p:spPr>
+          <a:xfrm>
+            <a:off x="4943480" y="1448780"/>
+            <a:ext cx="4509120" cy="4509120"/>
+          </a:xfrm>
+          <a:prstGeom prst="rect">
+            <a:avLst/>
+          </a:prstGeom>
+          <a:noFill/>
+          <a:ln>
+            <a:noFill/>
+          </a:ln>
+        </p:spPr>
+        <p:style>
+          <a:lnRef idx="2">
+            <a:schemeClr val="accent1">
+              <a:shade val="50000"/>
+            </a:schemeClr>
+          </a:lnRef>
+          <a:fillRef idx="1">
+            <a:schemeClr val="accent1"/>
+          </a:fillRef>
+          <a:effectRef idx="0">
+            <a:schemeClr val="accent1"/>
+          </a:effectRef>
+          <a:fontRef idx="minor">
+            <a:schemeClr val="lt1"/>
+          </a:fontRef>
+        </p:style>
+        <p:txBody>
+          <a:bodyPr rtlCol="0" anchor="ctr"/>
+          <a:lstStyle/>
+          <a:p>
+            <a:pPr algn="ctr"/>
+            <a:endParaRPr lang="zh-TW" altLang="en-US"/>
+          </a:p>
+        </p:txBody>
+      </p:sp>
+      <p:sp>
+        <p:nvSpPr>
+          <p:cNvPr id="11" name="矩形 10"/>
+          <p:cNvSpPr/>
+          <p:nvPr/>
+        </p:nvSpPr>
+        <p:spPr>
+          <a:xfrm>
+            <a:off x="4839247" y="1772817"/>
+            <a:ext cx="4509120" cy="4509119"/>
+          </a:xfrm>
+          <a:prstGeom prst="rect">
+            <a:avLst/>
+          </a:prstGeom>
+          <a:solidFill>
+            <a:schemeClr val="tx1"/>
+          </a:solidFill>
+          <a:ln>
+            <a:noFill/>
+          </a:ln>
+        </p:spPr>
+        <p:style>
+          <a:lnRef idx="2">
+            <a:schemeClr val="accent1">
+              <a:shade val="50000"/>
+            </a:schemeClr>
+          </a:lnRef>
+          <a:fillRef idx="1">
+            <a:schemeClr val="accent1"/>
+          </a:fillRef>
+          <a:effectRef idx="0">
+            <a:schemeClr val="accent1"/>
+          </a:effectRef>
+          <a:fontRef idx="minor">
+            <a:schemeClr val="lt1"/>
+          </a:fontRef>
+        </p:style>
+        <p:txBody>
+          <a:bodyPr rtlCol="0" anchor="ctr"/>
+          <a:lstStyle/>
+          <a:p>
+            <a:pPr algn="ctr"/>
+            <a:endParaRPr lang="zh-TW" altLang="en-US"/>
+          </a:p>
+        </p:txBody>
+      </p:sp>
     </p:spTree>
     <p:extLst>
       <p:ext uri="{BB962C8B-B14F-4D97-AF65-F5344CB8AC3E}">

</xml_diff>

<commit_message>
[AC] all fun AC
</commit_message>
<xml_diff>
--- a/final_project/mk_icon.pptx
+++ b/final_project/mk_icon.pptx
@@ -288,7 +288,7 @@
           <a:p>
             <a:fld id="{8DF3BF37-1F50-45DE-A1E5-A5CB67568958}" type="datetimeFigureOut">
               <a:rPr lang="zh-TW" altLang="en-US" smtClean="0"/>
-              <a:t>2023/12/24</a:t>
+              <a:t>2023/12/25</a:t>
             </a:fld>
             <a:endParaRPr lang="zh-TW" altLang="en-US"/>
           </a:p>
@@ -458,7 +458,7 @@
           <a:p>
             <a:fld id="{8DF3BF37-1F50-45DE-A1E5-A5CB67568958}" type="datetimeFigureOut">
               <a:rPr lang="zh-TW" altLang="en-US" smtClean="0"/>
-              <a:t>2023/12/24</a:t>
+              <a:t>2023/12/25</a:t>
             </a:fld>
             <a:endParaRPr lang="zh-TW" altLang="en-US"/>
           </a:p>
@@ -638,7 +638,7 @@
           <a:p>
             <a:fld id="{8DF3BF37-1F50-45DE-A1E5-A5CB67568958}" type="datetimeFigureOut">
               <a:rPr lang="zh-TW" altLang="en-US" smtClean="0"/>
-              <a:t>2023/12/24</a:t>
+              <a:t>2023/12/25</a:t>
             </a:fld>
             <a:endParaRPr lang="zh-TW" altLang="en-US"/>
           </a:p>
@@ -808,7 +808,7 @@
           <a:p>
             <a:fld id="{8DF3BF37-1F50-45DE-A1E5-A5CB67568958}" type="datetimeFigureOut">
               <a:rPr lang="zh-TW" altLang="en-US" smtClean="0"/>
-              <a:t>2023/12/24</a:t>
+              <a:t>2023/12/25</a:t>
             </a:fld>
             <a:endParaRPr lang="zh-TW" altLang="en-US"/>
           </a:p>
@@ -1054,7 +1054,7 @@
           <a:p>
             <a:fld id="{8DF3BF37-1F50-45DE-A1E5-A5CB67568958}" type="datetimeFigureOut">
               <a:rPr lang="zh-TW" altLang="en-US" smtClean="0"/>
-              <a:t>2023/12/24</a:t>
+              <a:t>2023/12/25</a:t>
             </a:fld>
             <a:endParaRPr lang="zh-TW" altLang="en-US"/>
           </a:p>
@@ -1342,7 +1342,7 @@
           <a:p>
             <a:fld id="{8DF3BF37-1F50-45DE-A1E5-A5CB67568958}" type="datetimeFigureOut">
               <a:rPr lang="zh-TW" altLang="en-US" smtClean="0"/>
-              <a:t>2023/12/24</a:t>
+              <a:t>2023/12/25</a:t>
             </a:fld>
             <a:endParaRPr lang="zh-TW" altLang="en-US"/>
           </a:p>
@@ -1764,7 +1764,7 @@
           <a:p>
             <a:fld id="{8DF3BF37-1F50-45DE-A1E5-A5CB67568958}" type="datetimeFigureOut">
               <a:rPr lang="zh-TW" altLang="en-US" smtClean="0"/>
-              <a:t>2023/12/24</a:t>
+              <a:t>2023/12/25</a:t>
             </a:fld>
             <a:endParaRPr lang="zh-TW" altLang="en-US"/>
           </a:p>
@@ -1882,7 +1882,7 @@
           <a:p>
             <a:fld id="{8DF3BF37-1F50-45DE-A1E5-A5CB67568958}" type="datetimeFigureOut">
               <a:rPr lang="zh-TW" altLang="en-US" smtClean="0"/>
-              <a:t>2023/12/24</a:t>
+              <a:t>2023/12/25</a:t>
             </a:fld>
             <a:endParaRPr lang="zh-TW" altLang="en-US"/>
           </a:p>
@@ -1977,7 +1977,7 @@
           <a:p>
             <a:fld id="{8DF3BF37-1F50-45DE-A1E5-A5CB67568958}" type="datetimeFigureOut">
               <a:rPr lang="zh-TW" altLang="en-US" smtClean="0"/>
-              <a:t>2023/12/24</a:t>
+              <a:t>2023/12/25</a:t>
             </a:fld>
             <a:endParaRPr lang="zh-TW" altLang="en-US"/>
           </a:p>
@@ -2254,7 +2254,7 @@
           <a:p>
             <a:fld id="{8DF3BF37-1F50-45DE-A1E5-A5CB67568958}" type="datetimeFigureOut">
               <a:rPr lang="zh-TW" altLang="en-US" smtClean="0"/>
-              <a:t>2023/12/24</a:t>
+              <a:t>2023/12/25</a:t>
             </a:fld>
             <a:endParaRPr lang="zh-TW" altLang="en-US"/>
           </a:p>
@@ -2507,7 +2507,7 @@
           <a:p>
             <a:fld id="{8DF3BF37-1F50-45DE-A1E5-A5CB67568958}" type="datetimeFigureOut">
               <a:rPr lang="zh-TW" altLang="en-US" smtClean="0"/>
-              <a:t>2023/12/24</a:t>
+              <a:t>2023/12/25</a:t>
             </a:fld>
             <a:endParaRPr lang="zh-TW" altLang="en-US"/>
           </a:p>
@@ -2720,7 +2720,7 @@
           <a:p>
             <a:fld id="{8DF3BF37-1F50-45DE-A1E5-A5CB67568958}" type="datetimeFigureOut">
               <a:rPr lang="zh-TW" altLang="en-US" smtClean="0"/>
-              <a:t>2023/12/24</a:t>
+              <a:t>2023/12/25</a:t>
             </a:fld>
             <a:endParaRPr lang="zh-TW" altLang="en-US"/>
           </a:p>
@@ -3402,7 +3402,7 @@
         </p:nvSpPr>
         <p:spPr>
           <a:xfrm>
-            <a:off x="4839247" y="1772817"/>
+            <a:off x="4841721" y="1772816"/>
             <a:ext cx="4509120" cy="4509119"/>
           </a:xfrm>
           <a:prstGeom prst="rect">

</xml_diff>